<commit_message>
ClientRemoteService multithread protection UserManual and design update.
</commit_message>
<xml_diff>
--- a/doc/DDSCS.pptx
+++ b/doc/DDSCS.pptx
@@ -279,7 +279,7 @@
             <a:fld id="{59D7ED44-D62D-4218-9C47-82141F3A3F95}" type="datetimeFigureOut">
               <a:rPr lang="es-ES" smtClean="0"/>
               <a:pPr/>
-              <a:t>29/09/2009</a:t>
+              <a:t>16/11/2009</a:t>
             </a:fld>
             <a:endParaRPr lang="es-ES"/>
           </a:p>
@@ -825,7 +825,7 @@
             <a:fld id="{59D7ED44-D62D-4218-9C47-82141F3A3F95}" type="datetimeFigureOut">
               <a:rPr lang="es-ES" smtClean="0"/>
               <a:pPr/>
-              <a:t>29/09/2009</a:t>
+              <a:t>16/11/2009</a:t>
             </a:fld>
             <a:endParaRPr lang="es-ES"/>
           </a:p>
@@ -9875,81 +9875,24 @@
           <a:p>
             <a:r>
               <a:rPr lang="es-ES" dirty="0" smtClean="0"/>
-              <a:t>DDS </a:t>
-            </a:r>
+              <a:t>DDS implementa el modelo publicación/subscripción pero no llamadas a procedimiento remoto</a:t>
+            </a:r>
+          </a:p>
+          <a:p>
+            <a:endParaRPr lang="es-ES" dirty="0" smtClean="0"/>
+          </a:p>
+          <a:p>
             <a:r>
               <a:rPr lang="es-ES" dirty="0" smtClean="0"/>
-              <a:t>implementa el modelo </a:t>
-            </a:r>
+              <a:t>Con DDS se puede  implementar este patrón:</a:t>
+            </a:r>
+          </a:p>
+          <a:p>
+            <a:pPr lvl="1"/>
             <a:r>
               <a:rPr lang="es-ES" dirty="0" smtClean="0"/>
-              <a:t>publicación/subscripción pero </a:t>
-            </a:r>
-            <a:r>
-              <a:rPr lang="es-ES" dirty="0" smtClean="0"/>
-              <a:t>no llamadas a procedimiento </a:t>
-            </a:r>
-            <a:r>
-              <a:rPr lang="es-ES" dirty="0" smtClean="0"/>
-              <a:t>remoto</a:t>
-            </a:r>
-          </a:p>
-          <a:p>
-            <a:endParaRPr lang="es-ES" dirty="0" smtClean="0"/>
-          </a:p>
-          <a:p>
-            <a:r>
-              <a:rPr lang="es-ES" dirty="0" smtClean="0"/>
-              <a:t>Con </a:t>
-            </a:r>
-            <a:r>
-              <a:rPr lang="es-ES" dirty="0" smtClean="0"/>
-              <a:t>DDS </a:t>
-            </a:r>
-            <a:r>
-              <a:rPr lang="es-ES" dirty="0" smtClean="0"/>
-              <a:t>se puede  </a:t>
-            </a:r>
-            <a:r>
-              <a:rPr lang="es-ES" dirty="0" smtClean="0"/>
-              <a:t>implementar este patrón</a:t>
-            </a:r>
-            <a:r>
-              <a:rPr lang="es-ES" dirty="0" smtClean="0"/>
-              <a:t>:</a:t>
-            </a:r>
-          </a:p>
-          <a:p>
-            <a:pPr lvl="1"/>
-            <a:r>
-              <a:rPr lang="es-ES" dirty="0" smtClean="0"/>
-              <a:t> </a:t>
-            </a:r>
-            <a:r>
-              <a:rPr lang="es-ES" dirty="0" smtClean="0"/>
-              <a:t>Dada una función remota a la que </a:t>
-            </a:r>
-            <a:r>
-              <a:rPr lang="es-ES" dirty="0" smtClean="0"/>
-              <a:t>se quiera </a:t>
-            </a:r>
-            <a:r>
-              <a:rPr lang="es-ES" dirty="0" smtClean="0"/>
-              <a:t>llamar, </a:t>
-            </a:r>
-            <a:r>
-              <a:rPr lang="es-ES" dirty="0" smtClean="0"/>
-              <a:t>se deben </a:t>
-            </a:r>
-            <a:r>
-              <a:rPr lang="es-ES" dirty="0" smtClean="0"/>
-              <a:t>crear un par de tópicos, uno para los parámetros de entrada de la función y otro para los de salida, así como codificar el comportamiento </a:t>
-            </a:r>
-            <a:r>
-              <a:rPr lang="es-ES" dirty="0" smtClean="0"/>
-              <a:t>cliente/servidor…</a:t>
-            </a:r>
-            <a:endParaRPr lang="es-ES" dirty="0" smtClean="0"/>
+              <a:t> Dada una función remota a la que se quiera llamar, se deben crear un par de tópicos, uno para los parámetros de entrada de la función y otro para los de salida, así como codificar el comportamiento cliente/servidor…</a:t>
+            </a:r>
           </a:p>
         </p:txBody>
       </p:sp>
@@ -10423,15 +10366,14 @@
         </p:nvPicPr>
         <p:blipFill>
           <a:blip r:embed="rId2" cstate="print"/>
-          <a:srcRect/>
           <a:stretch>
             <a:fillRect/>
           </a:stretch>
         </p:blipFill>
         <p:spPr bwMode="auto">
           <a:xfrm>
-            <a:off x="714348" y="2143116"/>
-            <a:ext cx="7870884" cy="3714763"/>
+            <a:off x="757258" y="2143116"/>
+            <a:ext cx="7785064" cy="3714763"/>
           </a:xfrm>
           <a:prstGeom prst="rect">
             <a:avLst/>
@@ -10519,7 +10461,6 @@
               <a:rPr lang="es-ES" sz="2400" dirty="0" smtClean="0"/>
               <a:t>Enfoque similar a CORBA pero más sencillo de utilizar y con calidades de servicio configurables.</a:t>
             </a:r>
-            <a:endParaRPr lang="es-ES" sz="2400" dirty="0" smtClean="0"/>
           </a:p>
           <a:p>
             <a:r>
@@ -10544,11 +10485,7 @@
           <a:p>
             <a:r>
               <a:rPr lang="es-ES" sz="2400" dirty="0" smtClean="0"/>
-              <a:t>Generación </a:t>
-            </a:r>
-            <a:r>
-              <a:rPr lang="es-ES" sz="2400" dirty="0" smtClean="0"/>
-              <a:t>automática de: </a:t>
+              <a:t>Generación automática de: </a:t>
             </a:r>
             <a:endParaRPr lang="es-ES" dirty="0" smtClean="0"/>
           </a:p>

</xml_diff>